<commit_message>
Update IO Assignments and controller layout
</commit_message>
<xml_diff>
--- a/ControllerLayout.pptx
+++ b/ControllerLayout.pptx
@@ -6,8 +6,7 @@
   </p:sldMasterIdLst>
   <p:sldIdLst>
     <p:sldId id="256" r:id="rId2"/>
-    <p:sldId id="258" r:id="rId3"/>
-    <p:sldId id="257" r:id="rId4"/>
+    <p:sldId id="257" r:id="rId3"/>
   </p:sldIdLst>
   <p:sldSz cx="9144000" cy="6858000" type="screen4x3"/>
   <p:notesSz cx="7010400" cy="9372600"/>
@@ -291,7 +290,7 @@
             <a:fld id="{D959F413-3B1F-4EDA-9678-B877E1C4A860}" type="datetimeFigureOut">
               <a:rPr lang="en-US" smtClean="0"/>
               <a:pPr/>
-              <a:t>3/3/2012</a:t>
+              <a:t>2/4/2013</a:t>
             </a:fld>
             <a:endParaRPr lang="en-US"/>
           </a:p>
@@ -458,7 +457,7 @@
             <a:fld id="{D959F413-3B1F-4EDA-9678-B877E1C4A860}" type="datetimeFigureOut">
               <a:rPr lang="en-US" smtClean="0"/>
               <a:pPr/>
-              <a:t>3/3/2012</a:t>
+              <a:t>2/4/2013</a:t>
             </a:fld>
             <a:endParaRPr lang="en-US"/>
           </a:p>
@@ -635,7 +634,7 @@
             <a:fld id="{D959F413-3B1F-4EDA-9678-B877E1C4A860}" type="datetimeFigureOut">
               <a:rPr lang="en-US" smtClean="0"/>
               <a:pPr/>
-              <a:t>3/3/2012</a:t>
+              <a:t>2/4/2013</a:t>
             </a:fld>
             <a:endParaRPr lang="en-US"/>
           </a:p>
@@ -802,7 +801,7 @@
             <a:fld id="{D959F413-3B1F-4EDA-9678-B877E1C4A860}" type="datetimeFigureOut">
               <a:rPr lang="en-US" smtClean="0"/>
               <a:pPr/>
-              <a:t>3/3/2012</a:t>
+              <a:t>2/4/2013</a:t>
             </a:fld>
             <a:endParaRPr lang="en-US"/>
           </a:p>
@@ -1045,7 +1044,7 @@
             <a:fld id="{D959F413-3B1F-4EDA-9678-B877E1C4A860}" type="datetimeFigureOut">
               <a:rPr lang="en-US" smtClean="0"/>
               <a:pPr/>
-              <a:t>3/3/2012</a:t>
+              <a:t>2/4/2013</a:t>
             </a:fld>
             <a:endParaRPr lang="en-US"/>
           </a:p>
@@ -1330,7 +1329,7 @@
             <a:fld id="{D959F413-3B1F-4EDA-9678-B877E1C4A860}" type="datetimeFigureOut">
               <a:rPr lang="en-US" smtClean="0"/>
               <a:pPr/>
-              <a:t>3/3/2012</a:t>
+              <a:t>2/4/2013</a:t>
             </a:fld>
             <a:endParaRPr lang="en-US"/>
           </a:p>
@@ -1749,7 +1748,7 @@
             <a:fld id="{D959F413-3B1F-4EDA-9678-B877E1C4A860}" type="datetimeFigureOut">
               <a:rPr lang="en-US" smtClean="0"/>
               <a:pPr/>
-              <a:t>3/3/2012</a:t>
+              <a:t>2/4/2013</a:t>
             </a:fld>
             <a:endParaRPr lang="en-US"/>
           </a:p>
@@ -1864,7 +1863,7 @@
             <a:fld id="{D959F413-3B1F-4EDA-9678-B877E1C4A860}" type="datetimeFigureOut">
               <a:rPr lang="en-US" smtClean="0"/>
               <a:pPr/>
-              <a:t>3/3/2012</a:t>
+              <a:t>2/4/2013</a:t>
             </a:fld>
             <a:endParaRPr lang="en-US"/>
           </a:p>
@@ -1956,7 +1955,7 @@
             <a:fld id="{D959F413-3B1F-4EDA-9678-B877E1C4A860}" type="datetimeFigureOut">
               <a:rPr lang="en-US" smtClean="0"/>
               <a:pPr/>
-              <a:t>3/3/2012</a:t>
+              <a:t>2/4/2013</a:t>
             </a:fld>
             <a:endParaRPr lang="en-US"/>
           </a:p>
@@ -2230,7 +2229,7 @@
             <a:fld id="{D959F413-3B1F-4EDA-9678-B877E1C4A860}" type="datetimeFigureOut">
               <a:rPr lang="en-US" smtClean="0"/>
               <a:pPr/>
-              <a:t>3/3/2012</a:t>
+              <a:t>2/4/2013</a:t>
             </a:fld>
             <a:endParaRPr lang="en-US"/>
           </a:p>
@@ -2484,7 +2483,7 @@
             <a:fld id="{D959F413-3B1F-4EDA-9678-B877E1C4A860}" type="datetimeFigureOut">
               <a:rPr lang="en-US" smtClean="0"/>
               <a:pPr/>
-              <a:t>3/3/2012</a:t>
+              <a:t>2/4/2013</a:t>
             </a:fld>
             <a:endParaRPr lang="en-US"/>
           </a:p>
@@ -2694,7 +2693,7 @@
             <a:fld id="{D959F413-3B1F-4EDA-9678-B877E1C4A860}" type="datetimeFigureOut">
               <a:rPr lang="en-US" smtClean="0"/>
               <a:pPr/>
-              <a:t>3/3/2012</a:t>
+              <a:t>2/4/2013</a:t>
             </a:fld>
             <a:endParaRPr lang="en-US"/>
           </a:p>
@@ -3139,8 +3138,8 @@
         </p:nvSpPr>
         <p:spPr>
           <a:xfrm>
-            <a:off x="3276600" y="152400"/>
-            <a:ext cx="1524000" cy="307777"/>
+            <a:off x="3733800" y="152400"/>
+            <a:ext cx="914400" cy="276999"/>
           </a:xfrm>
           <a:prstGeom prst="rect">
             <a:avLst/>
@@ -3163,11 +3162,7 @@
             <a:pPr algn="ctr"/>
             <a:r>
               <a:rPr lang="en-US" sz="1200" dirty="0" smtClean="0"/>
-              <a:t>Auto </a:t>
-            </a:r>
-            <a:r>
-              <a:rPr lang="en-US" sz="1400" dirty="0" smtClean="0"/>
-              <a:t>Mode</a:t>
+              <a:t>PTO Test</a:t>
             </a:r>
             <a:endParaRPr lang="en-US" sz="1400" dirty="0"/>
           </a:p>
@@ -3182,9 +3177,9 @@
           <p:nvPr/>
         </p:nvCxnSpPr>
         <p:spPr>
-          <a:xfrm flipH="1">
-            <a:off x="3581400" y="460177"/>
-            <a:ext cx="457200" cy="911423"/>
+          <a:xfrm rot="5400000">
+            <a:off x="3377002" y="633801"/>
+            <a:ext cx="1018401" cy="609596"/>
           </a:xfrm>
           <a:prstGeom prst="straightConnector1">
             <a:avLst/>
@@ -3240,7 +3235,7 @@
             <a:pPr algn="ctr"/>
             <a:r>
               <a:rPr lang="en-US" sz="1200" dirty="0" smtClean="0"/>
-              <a:t>Ramp</a:t>
+              <a:t>Climb</a:t>
             </a:r>
             <a:endParaRPr lang="en-US" sz="1200" dirty="0"/>
           </a:p>
@@ -3309,10 +3304,6 @@
           <a:lstStyle/>
           <a:p>
             <a:pPr algn="ctr"/>
-            <a:r>
-              <a:rPr lang="en-US" sz="1200" dirty="0" smtClean="0"/>
-              <a:t>Key Mode</a:t>
-            </a:r>
             <a:endParaRPr lang="en-US" sz="1200" dirty="0"/>
           </a:p>
         </p:txBody>
@@ -3361,7 +3352,7 @@
         <p:spPr>
           <a:xfrm>
             <a:off x="5029200" y="609600"/>
-            <a:ext cx="1371600" cy="276999"/>
+            <a:ext cx="1371600" cy="461665"/>
           </a:xfrm>
           <a:prstGeom prst="rect">
             <a:avLst/>
@@ -3384,7 +3375,7 @@
             <a:pPr algn="ctr"/>
             <a:r>
               <a:rPr lang="en-US" sz="1200" dirty="0" smtClean="0"/>
-              <a:t>Fender Mode</a:t>
+              <a:t>Shooter Feed Test</a:t>
             </a:r>
             <a:endParaRPr lang="en-US" sz="1200" dirty="0"/>
           </a:p>
@@ -3596,10 +3587,7 @@
           </a:bodyPr>
           <a:lstStyle/>
           <a:p>
-            <a:r>
-              <a:rPr lang="en-US" sz="1200" dirty="0" smtClean="0"/>
-              <a:t>Stage 2 Up/Down</a:t>
-            </a:r>
+            <a:pPr algn="ctr"/>
             <a:endParaRPr lang="en-US" sz="1200" dirty="0"/>
           </a:p>
         </p:txBody>
@@ -3669,10 +3657,6 @@
           <a:lstStyle/>
           <a:p>
             <a:pPr algn="ctr"/>
-            <a:r>
-              <a:rPr lang="en-US" sz="1200" dirty="0" smtClean="0"/>
-              <a:t>Fin Toggle</a:t>
-            </a:r>
             <a:endParaRPr lang="en-US" sz="1200" dirty="0"/>
           </a:p>
         </p:txBody>
@@ -3720,8 +3704,8 @@
         </p:nvSpPr>
         <p:spPr>
           <a:xfrm>
-            <a:off x="381000" y="3048000"/>
-            <a:ext cx="1981200" cy="276999"/>
+            <a:off x="990600" y="3048000"/>
+            <a:ext cx="1295400" cy="276999"/>
           </a:xfrm>
           <a:prstGeom prst="rect">
             <a:avLst/>
@@ -3744,7 +3728,7 @@
             <a:pPr algn="ctr"/>
             <a:r>
               <a:rPr lang="en-US" sz="1200" dirty="0" smtClean="0"/>
-              <a:t>Stage 1 &amp; Fin Up/Down</a:t>
+              <a:t>Climber Test</a:t>
             </a:r>
             <a:endParaRPr lang="en-US" sz="1200" dirty="0"/>
           </a:p>
@@ -3753,15 +3737,13 @@
       <p:cxnSp>
         <p:nvCxnSpPr>
           <p:cNvPr id="40" name="Straight Arrow Connector 39"/>
-          <p:cNvCxnSpPr>
-            <a:stCxn id="39" idx="0"/>
-          </p:cNvCxnSpPr>
+          <p:cNvCxnSpPr/>
           <p:nvPr/>
         </p:nvCxnSpPr>
         <p:spPr>
-          <a:xfrm flipV="1">
-            <a:off x="1371600" y="2362200"/>
-            <a:ext cx="631183" cy="685800"/>
+          <a:xfrm rot="5400000" flipH="1" flipV="1">
+            <a:off x="1409702" y="2628900"/>
+            <a:ext cx="685799" cy="152401"/>
           </a:xfrm>
           <a:prstGeom prst="straightConnector1">
             <a:avLst/>
@@ -3817,8 +3799,9 @@
             <a:pPr algn="ctr"/>
             <a:r>
               <a:rPr lang="en-US" sz="1200" dirty="0" smtClean="0"/>
-              <a:t>Inclination Up</a:t>
-            </a:r>
+              <a:t>Shooter Up</a:t>
+            </a:r>
+            <a:endParaRPr lang="en-US" sz="1200" dirty="0" smtClean="0"/>
           </a:p>
         </p:txBody>
       </p:sp>
@@ -3831,7 +3814,7 @@
         <p:spPr>
           <a:xfrm>
             <a:off x="228600" y="2286000"/>
-            <a:ext cx="1219199" cy="461665"/>
+            <a:ext cx="1219199" cy="276999"/>
           </a:xfrm>
           <a:prstGeom prst="rect">
             <a:avLst/>
@@ -3853,9 +3836,10 @@
           <a:p>
             <a:pPr algn="ctr"/>
             <a:r>
-              <a:rPr lang="en-US" sz="1200" dirty="0" smtClean="0"/>
-              <a:t>Inclination Down</a:t>
-            </a:r>
+              <a:rPr lang="en-US" sz="1200" smtClean="0"/>
+              <a:t>Shooter Down</a:t>
+            </a:r>
+            <a:endParaRPr lang="en-US" sz="1200" dirty="0" smtClean="0"/>
           </a:p>
         </p:txBody>
       </p:sp>
@@ -3903,9 +3887,9 @@
           <p:nvPr/>
         </p:nvCxnSpPr>
         <p:spPr>
-          <a:xfrm flipV="1">
-            <a:off x="838200" y="1828800"/>
-            <a:ext cx="381000" cy="457200"/>
+          <a:xfrm rot="5400000" flipH="1" flipV="1">
+            <a:off x="800100" y="1866900"/>
+            <a:ext cx="457200" cy="381000"/>
           </a:xfrm>
           <a:prstGeom prst="straightConnector1">
             <a:avLst/>
@@ -3938,7 +3922,7 @@
         <p:spPr>
           <a:xfrm>
             <a:off x="7772400" y="3581400"/>
-            <a:ext cx="762000" cy="276999"/>
+            <a:ext cx="762000" cy="461665"/>
           </a:xfrm>
           <a:prstGeom prst="rect">
             <a:avLst/>
@@ -3961,7 +3945,7 @@
             <a:pPr algn="ctr"/>
             <a:r>
               <a:rPr lang="en-US" sz="1200" dirty="0" smtClean="0"/>
-              <a:t>Pickup</a:t>
+              <a:t>Climber Deploy</a:t>
             </a:r>
             <a:endParaRPr lang="en-US" sz="1200" dirty="0"/>
           </a:p>
@@ -3976,9 +3960,9 @@
           <p:nvPr/>
         </p:nvCxnSpPr>
         <p:spPr>
-          <a:xfrm flipH="1">
-            <a:off x="7543802" y="3858399"/>
-            <a:ext cx="609598" cy="1145737"/>
+          <a:xfrm rot="5400000">
+            <a:off x="7368066" y="4218801"/>
+            <a:ext cx="961071" cy="609598"/>
           </a:xfrm>
           <a:prstGeom prst="straightConnector1">
             <a:avLst/>
@@ -4032,10 +4016,6 @@
           <a:lstStyle/>
           <a:p>
             <a:pPr algn="ctr"/>
-            <a:r>
-              <a:rPr lang="en-US" sz="1200" dirty="0" smtClean="0"/>
-              <a:t>Turret Right</a:t>
-            </a:r>
             <a:endParaRPr lang="en-US" sz="1200" dirty="0"/>
           </a:p>
         </p:txBody>
@@ -4105,10 +4085,6 @@
           <a:lstStyle/>
           <a:p>
             <a:pPr algn="ctr"/>
-            <a:r>
-              <a:rPr lang="en-US" sz="1200" dirty="0" smtClean="0"/>
-              <a:t>Turret Left</a:t>
-            </a:r>
             <a:endParaRPr lang="en-US" sz="1200" dirty="0"/>
           </a:p>
         </p:txBody>
@@ -4176,10 +4152,6 @@
           <a:lstStyle/>
           <a:p>
             <a:pPr algn="ctr"/>
-            <a:r>
-              <a:rPr lang="en-US" sz="1200" dirty="0" smtClean="0"/>
-              <a:t>Toggle Camera</a:t>
-            </a:r>
             <a:endParaRPr lang="en-US" sz="1200" dirty="0"/>
           </a:p>
         </p:txBody>
@@ -4228,7 +4200,7 @@
         <p:spPr>
           <a:xfrm>
             <a:off x="1676400" y="304800"/>
-            <a:ext cx="762000" cy="461665"/>
+            <a:ext cx="762000" cy="276999"/>
           </a:xfrm>
           <a:prstGeom prst="rect">
             <a:avLst/>
@@ -4249,17 +4221,6 @@
           <a:lstStyle/>
           <a:p>
             <a:pPr algn="ctr"/>
-            <a:r>
-              <a:rPr lang="en-US" sz="1200" dirty="0" smtClean="0"/>
-              <a:t>Clearing </a:t>
-            </a:r>
-          </a:p>
-          <a:p>
-            <a:pPr algn="ctr"/>
-            <a:r>
-              <a:rPr lang="en-US" sz="1200" dirty="0" smtClean="0"/>
-              <a:t>Mode</a:t>
-            </a:r>
             <a:endParaRPr lang="en-US" sz="1200" dirty="0"/>
           </a:p>
         </p:txBody>
@@ -4273,9 +4234,9 @@
           <p:nvPr/>
         </p:nvCxnSpPr>
         <p:spPr>
-          <a:xfrm>
-            <a:off x="2057400" y="766465"/>
-            <a:ext cx="76200" cy="376535"/>
+          <a:xfrm rot="16200000" flipH="1">
+            <a:off x="1814900" y="824299"/>
+            <a:ext cx="561201" cy="76200"/>
           </a:xfrm>
           <a:prstGeom prst="straightConnector1">
             <a:avLst/>
@@ -4308,1121 +4269,6 @@
 </file>
 
 <file path=ppt/slides/slide2.xml><?xml version="1.0" encoding="utf-8"?>
-<p:sld xmlns:a="http://schemas.openxmlformats.org/drawingml/2006/main" xmlns:r="http://schemas.openxmlformats.org/officeDocument/2006/relationships" xmlns:p="http://schemas.openxmlformats.org/presentationml/2006/main">
-  <p:cSld>
-    <p:spTree>
-      <p:nvGrpSpPr>
-        <p:cNvPr id="1" name=""/>
-        <p:cNvGrpSpPr/>
-        <p:nvPr/>
-      </p:nvGrpSpPr>
-      <p:grpSpPr>
-        <a:xfrm>
-          <a:off x="0" y="0"/>
-          <a:ext cx="0" cy="0"/>
-          <a:chOff x="0" y="0"/>
-          <a:chExt cx="0" cy="0"/>
-        </a:xfrm>
-      </p:grpSpPr>
-      <p:pic>
-        <p:nvPicPr>
-          <p:cNvPr id="1026" name="Picture 2"/>
-          <p:cNvPicPr>
-            <a:picLocks noChangeAspect="1" noChangeArrowheads="1"/>
-          </p:cNvPicPr>
-          <p:nvPr/>
-        </p:nvPicPr>
-        <p:blipFill>
-          <a:blip r:embed="rId2" cstate="print"/>
-          <a:srcRect/>
-          <a:stretch>
-            <a:fillRect/>
-          </a:stretch>
-        </p:blipFill>
-        <p:spPr bwMode="auto">
-          <a:xfrm>
-            <a:off x="0" y="0"/>
-            <a:ext cx="5305425" cy="3857625"/>
-          </a:xfrm>
-          <a:prstGeom prst="rect">
-            <a:avLst/>
-          </a:prstGeom>
-          <a:noFill/>
-          <a:ln w="9525">
-            <a:noFill/>
-            <a:miter lim="800000"/>
-            <a:headEnd/>
-            <a:tailEnd/>
-          </a:ln>
-          <a:effectLst/>
-        </p:spPr>
-      </p:pic>
-      <p:pic>
-        <p:nvPicPr>
-          <p:cNvPr id="1027" name="Picture 3"/>
-          <p:cNvPicPr>
-            <a:picLocks noChangeAspect="1" noChangeArrowheads="1"/>
-          </p:cNvPicPr>
-          <p:nvPr/>
-        </p:nvPicPr>
-        <p:blipFill>
-          <a:blip r:embed="rId3" cstate="print"/>
-          <a:srcRect/>
-          <a:stretch>
-            <a:fillRect/>
-          </a:stretch>
-        </p:blipFill>
-        <p:spPr bwMode="auto">
-          <a:xfrm>
-            <a:off x="4800600" y="3343275"/>
-            <a:ext cx="4162425" cy="3514725"/>
-          </a:xfrm>
-          <a:prstGeom prst="rect">
-            <a:avLst/>
-          </a:prstGeom>
-          <a:noFill/>
-          <a:ln w="9525">
-            <a:noFill/>
-            <a:miter lim="800000"/>
-            <a:headEnd/>
-            <a:tailEnd/>
-          </a:ln>
-          <a:effectLst/>
-        </p:spPr>
-      </p:pic>
-      <p:sp>
-        <p:nvSpPr>
-          <p:cNvPr id="6" name="TextBox 5"/>
-          <p:cNvSpPr txBox="1"/>
-          <p:nvPr/>
-        </p:nvSpPr>
-        <p:spPr>
-          <a:xfrm>
-            <a:off x="3276600" y="152400"/>
-            <a:ext cx="1524000" cy="307777"/>
-          </a:xfrm>
-          <a:prstGeom prst="rect">
-            <a:avLst/>
-          </a:prstGeom>
-          <a:solidFill>
-            <a:schemeClr val="bg1"/>
-          </a:solidFill>
-          <a:ln>
-            <a:solidFill>
-              <a:schemeClr val="tx1"/>
-            </a:solidFill>
-          </a:ln>
-        </p:spPr>
-        <p:txBody>
-          <a:bodyPr wrap="square" rtlCol="0">
-            <a:spAutoFit/>
-          </a:bodyPr>
-          <a:lstStyle/>
-          <a:p>
-            <a:pPr algn="ctr"/>
-            <a:r>
-              <a:rPr lang="en-US" sz="1200" dirty="0" smtClean="0"/>
-              <a:t>Auto </a:t>
-            </a:r>
-            <a:r>
-              <a:rPr lang="en-US" sz="1400" dirty="0" smtClean="0"/>
-              <a:t>Mode</a:t>
-            </a:r>
-            <a:endParaRPr lang="en-US" sz="1400" dirty="0"/>
-          </a:p>
-        </p:txBody>
-      </p:sp>
-      <p:cxnSp>
-        <p:nvCxnSpPr>
-          <p:cNvPr id="8" name="Straight Arrow Connector 7"/>
-          <p:cNvCxnSpPr>
-            <a:stCxn id="6" idx="2"/>
-          </p:cNvCxnSpPr>
-          <p:nvPr/>
-        </p:nvCxnSpPr>
-        <p:spPr>
-          <a:xfrm flipH="1">
-            <a:off x="3581400" y="460177"/>
-            <a:ext cx="457200" cy="911423"/>
-          </a:xfrm>
-          <a:prstGeom prst="straightConnector1">
-            <a:avLst/>
-          </a:prstGeom>
-          <a:ln>
-            <a:tailEnd type="arrow"/>
-          </a:ln>
-        </p:spPr>
-        <p:style>
-          <a:lnRef idx="1">
-            <a:schemeClr val="accent2"/>
-          </a:lnRef>
-          <a:fillRef idx="0">
-            <a:schemeClr val="accent2"/>
-          </a:fillRef>
-          <a:effectRef idx="0">
-            <a:schemeClr val="accent2"/>
-          </a:effectRef>
-          <a:fontRef idx="minor">
-            <a:schemeClr val="tx1"/>
-          </a:fontRef>
-        </p:style>
-      </p:cxnSp>
-      <p:sp>
-        <p:nvSpPr>
-          <p:cNvPr id="10" name="TextBox 9"/>
-          <p:cNvSpPr txBox="1"/>
-          <p:nvPr/>
-        </p:nvSpPr>
-        <p:spPr>
-          <a:xfrm>
-            <a:off x="3962400" y="2438400"/>
-            <a:ext cx="838200" cy="276999"/>
-          </a:xfrm>
-          <a:prstGeom prst="rect">
-            <a:avLst/>
-          </a:prstGeom>
-          <a:solidFill>
-            <a:schemeClr val="bg1"/>
-          </a:solidFill>
-          <a:ln>
-            <a:solidFill>
-              <a:schemeClr val="tx1"/>
-            </a:solidFill>
-          </a:ln>
-        </p:spPr>
-        <p:txBody>
-          <a:bodyPr wrap="square" rtlCol="0">
-            <a:spAutoFit/>
-          </a:bodyPr>
-          <a:lstStyle/>
-          <a:p>
-            <a:pPr algn="ctr"/>
-            <a:r>
-              <a:rPr lang="en-US" sz="1200" dirty="0" smtClean="0"/>
-              <a:t>Ramp</a:t>
-            </a:r>
-            <a:endParaRPr lang="en-US" sz="1200" dirty="0"/>
-          </a:p>
-        </p:txBody>
-      </p:sp>
-      <p:cxnSp>
-        <p:nvCxnSpPr>
-          <p:cNvPr id="12" name="Straight Arrow Connector 11"/>
-          <p:cNvCxnSpPr/>
-          <p:nvPr/>
-        </p:nvCxnSpPr>
-        <p:spPr>
-          <a:xfrm flipH="1" flipV="1">
-            <a:off x="3962400" y="1828800"/>
-            <a:ext cx="304800" cy="609600"/>
-          </a:xfrm>
-          <a:prstGeom prst="straightConnector1">
-            <a:avLst/>
-          </a:prstGeom>
-          <a:ln>
-            <a:tailEnd type="arrow"/>
-          </a:ln>
-        </p:spPr>
-        <p:style>
-          <a:lnRef idx="1">
-            <a:schemeClr val="accent2"/>
-          </a:lnRef>
-          <a:fillRef idx="0">
-            <a:schemeClr val="accent2"/>
-          </a:fillRef>
-          <a:effectRef idx="0">
-            <a:schemeClr val="accent2"/>
-          </a:effectRef>
-          <a:fontRef idx="minor">
-            <a:schemeClr val="tx1"/>
-          </a:fontRef>
-        </p:style>
-      </p:cxnSp>
-      <p:sp>
-        <p:nvSpPr>
-          <p:cNvPr id="13" name="TextBox 12"/>
-          <p:cNvSpPr txBox="1"/>
-          <p:nvPr/>
-        </p:nvSpPr>
-        <p:spPr>
-          <a:xfrm>
-            <a:off x="5181600" y="1371600"/>
-            <a:ext cx="1066800" cy="276999"/>
-          </a:xfrm>
-          <a:prstGeom prst="rect">
-            <a:avLst/>
-          </a:prstGeom>
-          <a:solidFill>
-            <a:schemeClr val="bg1"/>
-          </a:solidFill>
-          <a:ln>
-            <a:solidFill>
-              <a:schemeClr val="tx1"/>
-            </a:solidFill>
-          </a:ln>
-        </p:spPr>
-        <p:txBody>
-          <a:bodyPr wrap="square" rtlCol="0">
-            <a:spAutoFit/>
-          </a:bodyPr>
-          <a:lstStyle/>
-          <a:p>
-            <a:pPr algn="ctr"/>
-            <a:r>
-              <a:rPr lang="en-US" sz="1200" dirty="0" smtClean="0"/>
-              <a:t>Key Mode</a:t>
-            </a:r>
-            <a:endParaRPr lang="en-US" sz="1200" dirty="0"/>
-          </a:p>
-        </p:txBody>
-      </p:sp>
-      <p:cxnSp>
-        <p:nvCxnSpPr>
-          <p:cNvPr id="15" name="Straight Arrow Connector 14"/>
-          <p:cNvCxnSpPr>
-            <a:stCxn id="13" idx="1"/>
-          </p:cNvCxnSpPr>
-          <p:nvPr/>
-        </p:nvCxnSpPr>
-        <p:spPr>
-          <a:xfrm flipH="1">
-            <a:off x="4419600" y="1510100"/>
-            <a:ext cx="762000" cy="13901"/>
-          </a:xfrm>
-          <a:prstGeom prst="straightConnector1">
-            <a:avLst/>
-          </a:prstGeom>
-          <a:ln>
-            <a:tailEnd type="arrow"/>
-          </a:ln>
-        </p:spPr>
-        <p:style>
-          <a:lnRef idx="1">
-            <a:schemeClr val="accent2"/>
-          </a:lnRef>
-          <a:fillRef idx="0">
-            <a:schemeClr val="accent2"/>
-          </a:fillRef>
-          <a:effectRef idx="0">
-            <a:schemeClr val="accent2"/>
-          </a:effectRef>
-          <a:fontRef idx="minor">
-            <a:schemeClr val="tx1"/>
-          </a:fontRef>
-        </p:style>
-      </p:cxnSp>
-      <p:sp>
-        <p:nvSpPr>
-          <p:cNvPr id="16" name="TextBox 15"/>
-          <p:cNvSpPr txBox="1"/>
-          <p:nvPr/>
-        </p:nvSpPr>
-        <p:spPr>
-          <a:xfrm>
-            <a:off x="5029200" y="609600"/>
-            <a:ext cx="1371600" cy="276999"/>
-          </a:xfrm>
-          <a:prstGeom prst="rect">
-            <a:avLst/>
-          </a:prstGeom>
-          <a:solidFill>
-            <a:schemeClr val="bg1"/>
-          </a:solidFill>
-          <a:ln>
-            <a:solidFill>
-              <a:schemeClr val="tx1"/>
-            </a:solidFill>
-          </a:ln>
-        </p:spPr>
-        <p:txBody>
-          <a:bodyPr wrap="square" rtlCol="0">
-            <a:spAutoFit/>
-          </a:bodyPr>
-          <a:lstStyle/>
-          <a:p>
-            <a:pPr algn="ctr"/>
-            <a:r>
-              <a:rPr lang="en-US" sz="1200" dirty="0" smtClean="0"/>
-              <a:t>Fender Mode</a:t>
-            </a:r>
-            <a:endParaRPr lang="en-US" sz="1200" dirty="0"/>
-          </a:p>
-        </p:txBody>
-      </p:sp>
-      <p:cxnSp>
-        <p:nvCxnSpPr>
-          <p:cNvPr id="18" name="Straight Arrow Connector 17"/>
-          <p:cNvCxnSpPr/>
-          <p:nvPr/>
-        </p:nvCxnSpPr>
-        <p:spPr>
-          <a:xfrm flipH="1">
-            <a:off x="3962400" y="838200"/>
-            <a:ext cx="1143000" cy="286434"/>
-          </a:xfrm>
-          <a:prstGeom prst="straightConnector1">
-            <a:avLst/>
-          </a:prstGeom>
-          <a:ln>
-            <a:tailEnd type="arrow"/>
-          </a:ln>
-        </p:spPr>
-        <p:style>
-          <a:lnRef idx="1">
-            <a:schemeClr val="accent2"/>
-          </a:lnRef>
-          <a:fillRef idx="0">
-            <a:schemeClr val="accent2"/>
-          </a:fillRef>
-          <a:effectRef idx="0">
-            <a:schemeClr val="accent2"/>
-          </a:effectRef>
-          <a:fontRef idx="minor">
-            <a:schemeClr val="tx1"/>
-          </a:fontRef>
-        </p:style>
-      </p:cxnSp>
-      <p:sp>
-        <p:nvSpPr>
-          <p:cNvPr id="20" name="TextBox 19"/>
-          <p:cNvSpPr txBox="1"/>
-          <p:nvPr/>
-        </p:nvSpPr>
-        <p:spPr>
-          <a:xfrm>
-            <a:off x="5181600" y="2971800"/>
-            <a:ext cx="762000" cy="276999"/>
-          </a:xfrm>
-          <a:prstGeom prst="rect">
-            <a:avLst/>
-          </a:prstGeom>
-          <a:solidFill>
-            <a:schemeClr val="bg1"/>
-          </a:solidFill>
-          <a:ln>
-            <a:solidFill>
-              <a:schemeClr val="tx1"/>
-            </a:solidFill>
-          </a:ln>
-        </p:spPr>
-        <p:txBody>
-          <a:bodyPr wrap="square" rtlCol="0">
-            <a:spAutoFit/>
-          </a:bodyPr>
-          <a:lstStyle/>
-          <a:p>
-            <a:pPr algn="ctr"/>
-            <a:r>
-              <a:rPr lang="en-US" sz="1200" dirty="0" smtClean="0"/>
-              <a:t>Shoot</a:t>
-            </a:r>
-            <a:endParaRPr lang="en-US" sz="1200" dirty="0"/>
-          </a:p>
-        </p:txBody>
-      </p:sp>
-      <p:sp>
-        <p:nvSpPr>
-          <p:cNvPr id="21" name="TextBox 20"/>
-          <p:cNvSpPr txBox="1"/>
-          <p:nvPr/>
-        </p:nvSpPr>
-        <p:spPr>
-          <a:xfrm>
-            <a:off x="3352800" y="4495801"/>
-            <a:ext cx="1143000" cy="276999"/>
-          </a:xfrm>
-          <a:prstGeom prst="rect">
-            <a:avLst/>
-          </a:prstGeom>
-          <a:noFill/>
-          <a:ln>
-            <a:solidFill>
-              <a:schemeClr val="tx1"/>
-            </a:solidFill>
-          </a:ln>
-        </p:spPr>
-        <p:txBody>
-          <a:bodyPr wrap="square" rtlCol="0">
-            <a:spAutoFit/>
-          </a:bodyPr>
-          <a:lstStyle/>
-          <a:p>
-            <a:pPr algn="ctr"/>
-            <a:r>
-              <a:rPr lang="en-US" sz="1200" dirty="0" smtClean="0"/>
-              <a:t>Shooter Test</a:t>
-            </a:r>
-            <a:endParaRPr lang="en-US" sz="1200" dirty="0"/>
-          </a:p>
-        </p:txBody>
-      </p:sp>
-      <p:cxnSp>
-        <p:nvCxnSpPr>
-          <p:cNvPr id="23" name="Straight Arrow Connector 22"/>
-          <p:cNvCxnSpPr>
-            <a:stCxn id="20" idx="2"/>
-          </p:cNvCxnSpPr>
-          <p:nvPr/>
-        </p:nvCxnSpPr>
-        <p:spPr>
-          <a:xfrm flipH="1">
-            <a:off x="5334002" y="3248799"/>
-            <a:ext cx="228598" cy="572869"/>
-          </a:xfrm>
-          <a:prstGeom prst="straightConnector1">
-            <a:avLst/>
-          </a:prstGeom>
-          <a:ln>
-            <a:tailEnd type="arrow"/>
-          </a:ln>
-        </p:spPr>
-        <p:style>
-          <a:lnRef idx="1">
-            <a:schemeClr val="accent2"/>
-          </a:lnRef>
-          <a:fillRef idx="0">
-            <a:schemeClr val="accent2"/>
-          </a:fillRef>
-          <a:effectRef idx="0">
-            <a:schemeClr val="accent2"/>
-          </a:effectRef>
-          <a:fontRef idx="minor">
-            <a:schemeClr val="tx1"/>
-          </a:fontRef>
-        </p:style>
-      </p:cxnSp>
-      <p:cxnSp>
-        <p:nvCxnSpPr>
-          <p:cNvPr id="25" name="Straight Arrow Connector 24"/>
-          <p:cNvCxnSpPr>
-            <a:stCxn id="21" idx="3"/>
-          </p:cNvCxnSpPr>
-          <p:nvPr/>
-        </p:nvCxnSpPr>
-        <p:spPr>
-          <a:xfrm flipV="1">
-            <a:off x="4495800" y="4419603"/>
-            <a:ext cx="762000" cy="214698"/>
-          </a:xfrm>
-          <a:prstGeom prst="straightConnector1">
-            <a:avLst/>
-          </a:prstGeom>
-          <a:ln>
-            <a:tailEnd type="arrow"/>
-          </a:ln>
-        </p:spPr>
-        <p:style>
-          <a:lnRef idx="1">
-            <a:schemeClr val="accent2"/>
-          </a:lnRef>
-          <a:fillRef idx="0">
-            <a:schemeClr val="accent2"/>
-          </a:fillRef>
-          <a:effectRef idx="0">
-            <a:schemeClr val="accent2"/>
-          </a:effectRef>
-          <a:fontRef idx="minor">
-            <a:schemeClr val="tx1"/>
-          </a:fontRef>
-        </p:style>
-      </p:cxnSp>
-      <p:sp>
-        <p:nvSpPr>
-          <p:cNvPr id="31" name="TextBox 30"/>
-          <p:cNvSpPr txBox="1"/>
-          <p:nvPr/>
-        </p:nvSpPr>
-        <p:spPr>
-          <a:xfrm>
-            <a:off x="2590800" y="3048001"/>
-            <a:ext cx="1447800" cy="276999"/>
-          </a:xfrm>
-          <a:prstGeom prst="rect">
-            <a:avLst/>
-          </a:prstGeom>
-          <a:solidFill>
-            <a:schemeClr val="bg1"/>
-          </a:solidFill>
-          <a:ln>
-            <a:solidFill>
-              <a:schemeClr val="tx1"/>
-            </a:solidFill>
-          </a:ln>
-        </p:spPr>
-        <p:txBody>
-          <a:bodyPr wrap="square" rtlCol="0">
-            <a:spAutoFit/>
-          </a:bodyPr>
-          <a:lstStyle/>
-          <a:p>
-            <a:r>
-              <a:rPr lang="en-US" sz="1200" dirty="0" smtClean="0"/>
-              <a:t>Stage 2 Up/Down</a:t>
-            </a:r>
-            <a:endParaRPr lang="en-US" sz="1200" dirty="0"/>
-          </a:p>
-        </p:txBody>
-      </p:sp>
-      <p:cxnSp>
-        <p:nvCxnSpPr>
-          <p:cNvPr id="32" name="Straight Arrow Connector 31"/>
-          <p:cNvCxnSpPr>
-            <a:stCxn id="31" idx="0"/>
-          </p:cNvCxnSpPr>
-          <p:nvPr/>
-        </p:nvCxnSpPr>
-        <p:spPr>
-          <a:xfrm flipV="1">
-            <a:off x="3314700" y="2286001"/>
-            <a:ext cx="38100" cy="762000"/>
-          </a:xfrm>
-          <a:prstGeom prst="straightConnector1">
-            <a:avLst/>
-          </a:prstGeom>
-          <a:ln>
-            <a:tailEnd type="arrow"/>
-          </a:ln>
-        </p:spPr>
-        <p:style>
-          <a:lnRef idx="1">
-            <a:schemeClr val="accent2"/>
-          </a:lnRef>
-          <a:fillRef idx="0">
-            <a:schemeClr val="accent2"/>
-          </a:fillRef>
-          <a:effectRef idx="0">
-            <a:schemeClr val="accent2"/>
-          </a:effectRef>
-          <a:fontRef idx="minor">
-            <a:schemeClr val="tx1"/>
-          </a:fontRef>
-        </p:style>
-      </p:cxnSp>
-      <p:sp>
-        <p:nvSpPr>
-          <p:cNvPr id="35" name="TextBox 34"/>
-          <p:cNvSpPr txBox="1"/>
-          <p:nvPr/>
-        </p:nvSpPr>
-        <p:spPr>
-          <a:xfrm>
-            <a:off x="5029200" y="5791201"/>
-            <a:ext cx="990600" cy="276999"/>
-          </a:xfrm>
-          <a:prstGeom prst="rect">
-            <a:avLst/>
-          </a:prstGeom>
-          <a:solidFill>
-            <a:schemeClr val="bg1"/>
-          </a:solidFill>
-          <a:ln>
-            <a:solidFill>
-              <a:schemeClr val="tx1"/>
-            </a:solidFill>
-          </a:ln>
-        </p:spPr>
-        <p:txBody>
-          <a:bodyPr wrap="square" rtlCol="0">
-            <a:spAutoFit/>
-          </a:bodyPr>
-          <a:lstStyle/>
-          <a:p>
-            <a:pPr algn="ctr"/>
-            <a:r>
-              <a:rPr lang="en-US" sz="1200" dirty="0" smtClean="0"/>
-              <a:t>Fin Toggle</a:t>
-            </a:r>
-            <a:endParaRPr lang="en-US" sz="1200" dirty="0"/>
-          </a:p>
-        </p:txBody>
-      </p:sp>
-      <p:cxnSp>
-        <p:nvCxnSpPr>
-          <p:cNvPr id="36" name="Straight Arrow Connector 35"/>
-          <p:cNvCxnSpPr>
-            <a:stCxn id="35" idx="3"/>
-          </p:cNvCxnSpPr>
-          <p:nvPr/>
-        </p:nvCxnSpPr>
-        <p:spPr>
-          <a:xfrm flipV="1">
-            <a:off x="6019800" y="5715003"/>
-            <a:ext cx="1131173" cy="214698"/>
-          </a:xfrm>
-          <a:prstGeom prst="straightConnector1">
-            <a:avLst/>
-          </a:prstGeom>
-          <a:ln>
-            <a:tailEnd type="arrow"/>
-          </a:ln>
-        </p:spPr>
-        <p:style>
-          <a:lnRef idx="1">
-            <a:schemeClr val="accent2"/>
-          </a:lnRef>
-          <a:fillRef idx="0">
-            <a:schemeClr val="accent2"/>
-          </a:fillRef>
-          <a:effectRef idx="0">
-            <a:schemeClr val="accent2"/>
-          </a:effectRef>
-          <a:fontRef idx="minor">
-            <a:schemeClr val="tx1"/>
-          </a:fontRef>
-        </p:style>
-      </p:cxnSp>
-      <p:sp>
-        <p:nvSpPr>
-          <p:cNvPr id="39" name="TextBox 38"/>
-          <p:cNvSpPr txBox="1"/>
-          <p:nvPr/>
-        </p:nvSpPr>
-        <p:spPr>
-          <a:xfrm>
-            <a:off x="381000" y="3048000"/>
-            <a:ext cx="1981200" cy="276999"/>
-          </a:xfrm>
-          <a:prstGeom prst="rect">
-            <a:avLst/>
-          </a:prstGeom>
-          <a:solidFill>
-            <a:schemeClr val="bg1"/>
-          </a:solidFill>
-          <a:ln>
-            <a:solidFill>
-              <a:schemeClr val="tx1"/>
-            </a:solidFill>
-          </a:ln>
-        </p:spPr>
-        <p:txBody>
-          <a:bodyPr wrap="square" rtlCol="0">
-            <a:spAutoFit/>
-          </a:bodyPr>
-          <a:lstStyle/>
-          <a:p>
-            <a:pPr algn="ctr"/>
-            <a:r>
-              <a:rPr lang="en-US" sz="1200" dirty="0" smtClean="0"/>
-              <a:t>Stage 1 &amp; Fin Up/Down</a:t>
-            </a:r>
-            <a:endParaRPr lang="en-US" sz="1200" dirty="0"/>
-          </a:p>
-        </p:txBody>
-      </p:sp>
-      <p:cxnSp>
-        <p:nvCxnSpPr>
-          <p:cNvPr id="40" name="Straight Arrow Connector 39"/>
-          <p:cNvCxnSpPr>
-            <a:stCxn id="39" idx="0"/>
-          </p:cNvCxnSpPr>
-          <p:nvPr/>
-        </p:nvCxnSpPr>
-        <p:spPr>
-          <a:xfrm flipV="1">
-            <a:off x="1371600" y="2362200"/>
-            <a:ext cx="631183" cy="685800"/>
-          </a:xfrm>
-          <a:prstGeom prst="straightConnector1">
-            <a:avLst/>
-          </a:prstGeom>
-          <a:ln>
-            <a:tailEnd type="arrow"/>
-          </a:ln>
-        </p:spPr>
-        <p:style>
-          <a:lnRef idx="1">
-            <a:schemeClr val="accent2"/>
-          </a:lnRef>
-          <a:fillRef idx="0">
-            <a:schemeClr val="accent2"/>
-          </a:fillRef>
-          <a:effectRef idx="0">
-            <a:schemeClr val="accent2"/>
-          </a:effectRef>
-          <a:fontRef idx="minor">
-            <a:schemeClr val="tx1"/>
-          </a:fontRef>
-        </p:style>
-      </p:cxnSp>
-      <p:sp>
-        <p:nvSpPr>
-          <p:cNvPr id="38" name="TextBox 37"/>
-          <p:cNvSpPr txBox="1"/>
-          <p:nvPr/>
-        </p:nvSpPr>
-        <p:spPr>
-          <a:xfrm>
-            <a:off x="7772400" y="3581400"/>
-            <a:ext cx="762000" cy="276999"/>
-          </a:xfrm>
-          <a:prstGeom prst="rect">
-            <a:avLst/>
-          </a:prstGeom>
-          <a:solidFill>
-            <a:schemeClr val="bg1"/>
-          </a:solidFill>
-          <a:ln>
-            <a:solidFill>
-              <a:schemeClr val="tx1"/>
-            </a:solidFill>
-          </a:ln>
-        </p:spPr>
-        <p:txBody>
-          <a:bodyPr wrap="square" rtlCol="0">
-            <a:spAutoFit/>
-          </a:bodyPr>
-          <a:lstStyle/>
-          <a:p>
-            <a:pPr algn="ctr"/>
-            <a:r>
-              <a:rPr lang="en-US" sz="1200" dirty="0" smtClean="0"/>
-              <a:t>Pickup</a:t>
-            </a:r>
-            <a:endParaRPr lang="en-US" sz="1200" dirty="0"/>
-          </a:p>
-        </p:txBody>
-      </p:sp>
-      <p:cxnSp>
-        <p:nvCxnSpPr>
-          <p:cNvPr id="41" name="Straight Arrow Connector 40"/>
-          <p:cNvCxnSpPr>
-            <a:stCxn id="38" idx="2"/>
-          </p:cNvCxnSpPr>
-          <p:nvPr/>
-        </p:nvCxnSpPr>
-        <p:spPr>
-          <a:xfrm flipH="1">
-            <a:off x="7543802" y="3858399"/>
-            <a:ext cx="609598" cy="1145737"/>
-          </a:xfrm>
-          <a:prstGeom prst="straightConnector1">
-            <a:avLst/>
-          </a:prstGeom>
-          <a:ln>
-            <a:tailEnd type="arrow"/>
-          </a:ln>
-        </p:spPr>
-        <p:style>
-          <a:lnRef idx="1">
-            <a:schemeClr val="accent2"/>
-          </a:lnRef>
-          <a:fillRef idx="0">
-            <a:schemeClr val="accent2"/>
-          </a:fillRef>
-          <a:effectRef idx="0">
-            <a:schemeClr val="accent2"/>
-          </a:effectRef>
-          <a:fontRef idx="minor">
-            <a:schemeClr val="tx1"/>
-          </a:fontRef>
-        </p:style>
-      </p:cxnSp>
-      <p:sp>
-        <p:nvSpPr>
-          <p:cNvPr id="52" name="TextBox 51"/>
-          <p:cNvSpPr txBox="1"/>
-          <p:nvPr/>
-        </p:nvSpPr>
-        <p:spPr>
-          <a:xfrm>
-            <a:off x="1752600" y="1475601"/>
-            <a:ext cx="990600" cy="276999"/>
-          </a:xfrm>
-          <a:prstGeom prst="rect">
-            <a:avLst/>
-          </a:prstGeom>
-          <a:solidFill>
-            <a:schemeClr val="bg1"/>
-          </a:solidFill>
-          <a:ln>
-            <a:solidFill>
-              <a:schemeClr val="tx1"/>
-            </a:solidFill>
-          </a:ln>
-        </p:spPr>
-        <p:txBody>
-          <a:bodyPr wrap="square" rtlCol="0">
-            <a:spAutoFit/>
-          </a:bodyPr>
-          <a:lstStyle/>
-          <a:p>
-            <a:pPr algn="ctr"/>
-            <a:r>
-              <a:rPr lang="en-US" sz="1200" dirty="0" smtClean="0"/>
-              <a:t>Turret Right</a:t>
-            </a:r>
-            <a:endParaRPr lang="en-US" sz="1200" dirty="0"/>
-          </a:p>
-        </p:txBody>
-      </p:sp>
-      <p:cxnSp>
-        <p:nvCxnSpPr>
-          <p:cNvPr id="53" name="Straight Arrow Connector 52"/>
-          <p:cNvCxnSpPr>
-            <a:stCxn id="52" idx="1"/>
-          </p:cNvCxnSpPr>
-          <p:nvPr/>
-        </p:nvCxnSpPr>
-        <p:spPr>
-          <a:xfrm flipH="1" flipV="1">
-            <a:off x="1524000" y="1461700"/>
-            <a:ext cx="228600" cy="152401"/>
-          </a:xfrm>
-          <a:prstGeom prst="straightConnector1">
-            <a:avLst/>
-          </a:prstGeom>
-          <a:ln>
-            <a:tailEnd type="arrow"/>
-          </a:ln>
-        </p:spPr>
-        <p:style>
-          <a:lnRef idx="1">
-            <a:schemeClr val="accent2"/>
-          </a:lnRef>
-          <a:fillRef idx="0">
-            <a:schemeClr val="accent2"/>
-          </a:fillRef>
-          <a:effectRef idx="0">
-            <a:schemeClr val="accent2"/>
-          </a:effectRef>
-          <a:fontRef idx="minor">
-            <a:schemeClr val="tx1"/>
-          </a:fontRef>
-        </p:style>
-      </p:cxnSp>
-      <p:sp>
-        <p:nvSpPr>
-          <p:cNvPr id="57" name="TextBox 56"/>
-          <p:cNvSpPr txBox="1"/>
-          <p:nvPr/>
-        </p:nvSpPr>
-        <p:spPr>
-          <a:xfrm>
-            <a:off x="0" y="838200"/>
-            <a:ext cx="914400" cy="276999"/>
-          </a:xfrm>
-          <a:prstGeom prst="rect">
-            <a:avLst/>
-          </a:prstGeom>
-          <a:solidFill>
-            <a:schemeClr val="bg1"/>
-          </a:solidFill>
-          <a:ln>
-            <a:solidFill>
-              <a:schemeClr val="tx1"/>
-            </a:solidFill>
-          </a:ln>
-        </p:spPr>
-        <p:txBody>
-          <a:bodyPr wrap="square" rtlCol="0">
-            <a:spAutoFit/>
-          </a:bodyPr>
-          <a:lstStyle/>
-          <a:p>
-            <a:pPr algn="ctr"/>
-            <a:r>
-              <a:rPr lang="en-US" sz="1200" dirty="0" smtClean="0"/>
-              <a:t>Turret Left</a:t>
-            </a:r>
-            <a:endParaRPr lang="en-US" sz="1200" dirty="0"/>
-          </a:p>
-        </p:txBody>
-      </p:sp>
-      <p:cxnSp>
-        <p:nvCxnSpPr>
-          <p:cNvPr id="61" name="Straight Arrow Connector 60"/>
-          <p:cNvCxnSpPr/>
-          <p:nvPr/>
-        </p:nvCxnSpPr>
-        <p:spPr>
-          <a:xfrm>
-            <a:off x="495300" y="1143000"/>
-            <a:ext cx="266700" cy="381000"/>
-          </a:xfrm>
-          <a:prstGeom prst="straightConnector1">
-            <a:avLst/>
-          </a:prstGeom>
-          <a:ln>
-            <a:tailEnd type="arrow"/>
-          </a:ln>
-        </p:spPr>
-        <p:style>
-          <a:lnRef idx="1">
-            <a:schemeClr val="accent2"/>
-          </a:lnRef>
-          <a:fillRef idx="0">
-            <a:schemeClr val="accent2"/>
-          </a:fillRef>
-          <a:effectRef idx="0">
-            <a:schemeClr val="accent2"/>
-          </a:effectRef>
-          <a:fontRef idx="minor">
-            <a:schemeClr val="tx1"/>
-          </a:fontRef>
-        </p:style>
-      </p:cxnSp>
-      <p:sp>
-        <p:nvSpPr>
-          <p:cNvPr id="33" name="TextBox 32"/>
-          <p:cNvSpPr txBox="1"/>
-          <p:nvPr/>
-        </p:nvSpPr>
-        <p:spPr>
-          <a:xfrm>
-            <a:off x="2514600" y="609600"/>
-            <a:ext cx="1295400" cy="276999"/>
-          </a:xfrm>
-          <a:prstGeom prst="rect">
-            <a:avLst/>
-          </a:prstGeom>
-          <a:solidFill>
-            <a:schemeClr val="bg1"/>
-          </a:solidFill>
-          <a:ln>
-            <a:solidFill>
-              <a:schemeClr val="tx1"/>
-            </a:solidFill>
-          </a:ln>
-        </p:spPr>
-        <p:txBody>
-          <a:bodyPr wrap="square" rtlCol="0">
-            <a:spAutoFit/>
-          </a:bodyPr>
-          <a:lstStyle/>
-          <a:p>
-            <a:pPr algn="ctr"/>
-            <a:r>
-              <a:rPr lang="en-US" sz="1200" dirty="0" smtClean="0"/>
-              <a:t>Toggle Camera</a:t>
-            </a:r>
-            <a:endParaRPr lang="en-US" sz="1200" dirty="0"/>
-          </a:p>
-        </p:txBody>
-      </p:sp>
-      <p:cxnSp>
-        <p:nvCxnSpPr>
-          <p:cNvPr id="37" name="Straight Arrow Connector 36"/>
-          <p:cNvCxnSpPr>
-            <a:stCxn id="33" idx="2"/>
-          </p:cNvCxnSpPr>
-          <p:nvPr/>
-        </p:nvCxnSpPr>
-        <p:spPr>
-          <a:xfrm flipH="1">
-            <a:off x="3048000" y="886599"/>
-            <a:ext cx="114300" cy="180201"/>
-          </a:xfrm>
-          <a:prstGeom prst="straightConnector1">
-            <a:avLst/>
-          </a:prstGeom>
-          <a:ln>
-            <a:tailEnd type="arrow"/>
-          </a:ln>
-        </p:spPr>
-        <p:style>
-          <a:lnRef idx="1">
-            <a:schemeClr val="accent2"/>
-          </a:lnRef>
-          <a:fillRef idx="0">
-            <a:schemeClr val="accent2"/>
-          </a:fillRef>
-          <a:effectRef idx="0">
-            <a:schemeClr val="accent2"/>
-          </a:effectRef>
-          <a:fontRef idx="minor">
-            <a:schemeClr val="tx1"/>
-          </a:fontRef>
-        </p:style>
-      </p:cxnSp>
-      <p:sp>
-        <p:nvSpPr>
-          <p:cNvPr id="63" name="TextBox 62"/>
-          <p:cNvSpPr txBox="1"/>
-          <p:nvPr/>
-        </p:nvSpPr>
-        <p:spPr>
-          <a:xfrm>
-            <a:off x="1676400" y="304800"/>
-            <a:ext cx="762000" cy="461665"/>
-          </a:xfrm>
-          <a:prstGeom prst="rect">
-            <a:avLst/>
-          </a:prstGeom>
-          <a:solidFill>
-            <a:schemeClr val="bg1"/>
-          </a:solidFill>
-          <a:ln>
-            <a:solidFill>
-              <a:schemeClr val="tx1"/>
-            </a:solidFill>
-          </a:ln>
-        </p:spPr>
-        <p:txBody>
-          <a:bodyPr wrap="square" rtlCol="0">
-            <a:spAutoFit/>
-          </a:bodyPr>
-          <a:lstStyle/>
-          <a:p>
-            <a:pPr algn="ctr"/>
-            <a:r>
-              <a:rPr lang="en-US" sz="1200" dirty="0" smtClean="0"/>
-              <a:t>Clearing </a:t>
-            </a:r>
-          </a:p>
-          <a:p>
-            <a:pPr algn="ctr"/>
-            <a:r>
-              <a:rPr lang="en-US" sz="1200" dirty="0" smtClean="0"/>
-              <a:t>Mode</a:t>
-            </a:r>
-            <a:endParaRPr lang="en-US" sz="1200" dirty="0"/>
-          </a:p>
-        </p:txBody>
-      </p:sp>
-      <p:cxnSp>
-        <p:nvCxnSpPr>
-          <p:cNvPr id="65" name="Straight Arrow Connector 64"/>
-          <p:cNvCxnSpPr>
-            <a:stCxn id="63" idx="2"/>
-          </p:cNvCxnSpPr>
-          <p:nvPr/>
-        </p:nvCxnSpPr>
-        <p:spPr>
-          <a:xfrm>
-            <a:off x="2057400" y="766465"/>
-            <a:ext cx="76200" cy="376535"/>
-          </a:xfrm>
-          <a:prstGeom prst="straightConnector1">
-            <a:avLst/>
-          </a:prstGeom>
-          <a:ln>
-            <a:tailEnd type="arrow"/>
-          </a:ln>
-        </p:spPr>
-        <p:style>
-          <a:lnRef idx="1">
-            <a:schemeClr val="accent2"/>
-          </a:lnRef>
-          <a:fillRef idx="0">
-            <a:schemeClr val="accent2"/>
-          </a:fillRef>
-          <a:effectRef idx="0">
-            <a:schemeClr val="accent2"/>
-          </a:effectRef>
-          <a:fontRef idx="minor">
-            <a:schemeClr val="tx1"/>
-          </a:fontRef>
-        </p:style>
-      </p:cxnSp>
-    </p:spTree>
-  </p:cSld>
-  <p:clrMapOvr>
-    <a:masterClrMapping/>
-  </p:clrMapOvr>
-</p:sld>
-</file>
-
-<file path=ppt/slides/slide3.xml><?xml version="1.0" encoding="utf-8"?>
 <p:sld xmlns:a="http://schemas.openxmlformats.org/drawingml/2006/main" xmlns:r="http://schemas.openxmlformats.org/officeDocument/2006/relationships" xmlns:p="http://schemas.openxmlformats.org/presentationml/2006/main">
   <p:cSld>
     <p:spTree>

</xml_diff>

<commit_message>
Shooter & Climber testing 3/2
</commit_message>
<xml_diff>
--- a/ControllerLayout.pptx
+++ b/ControllerLayout.pptx
@@ -290,7 +290,7 @@
             <a:fld id="{D959F413-3B1F-4EDA-9678-B877E1C4A860}" type="datetimeFigureOut">
               <a:rPr lang="en-US" smtClean="0"/>
               <a:pPr/>
-              <a:t>2/4/2013</a:t>
+              <a:t>3/2/2013</a:t>
             </a:fld>
             <a:endParaRPr lang="en-US"/>
           </a:p>
@@ -457,7 +457,7 @@
             <a:fld id="{D959F413-3B1F-4EDA-9678-B877E1C4A860}" type="datetimeFigureOut">
               <a:rPr lang="en-US" smtClean="0"/>
               <a:pPr/>
-              <a:t>2/4/2013</a:t>
+              <a:t>3/2/2013</a:t>
             </a:fld>
             <a:endParaRPr lang="en-US"/>
           </a:p>
@@ -634,7 +634,7 @@
             <a:fld id="{D959F413-3B1F-4EDA-9678-B877E1C4A860}" type="datetimeFigureOut">
               <a:rPr lang="en-US" smtClean="0"/>
               <a:pPr/>
-              <a:t>2/4/2013</a:t>
+              <a:t>3/2/2013</a:t>
             </a:fld>
             <a:endParaRPr lang="en-US"/>
           </a:p>
@@ -801,7 +801,7 @@
             <a:fld id="{D959F413-3B1F-4EDA-9678-B877E1C4A860}" type="datetimeFigureOut">
               <a:rPr lang="en-US" smtClean="0"/>
               <a:pPr/>
-              <a:t>2/4/2013</a:t>
+              <a:t>3/2/2013</a:t>
             </a:fld>
             <a:endParaRPr lang="en-US"/>
           </a:p>
@@ -1044,7 +1044,7 @@
             <a:fld id="{D959F413-3B1F-4EDA-9678-B877E1C4A860}" type="datetimeFigureOut">
               <a:rPr lang="en-US" smtClean="0"/>
               <a:pPr/>
-              <a:t>2/4/2013</a:t>
+              <a:t>3/2/2013</a:t>
             </a:fld>
             <a:endParaRPr lang="en-US"/>
           </a:p>
@@ -1329,7 +1329,7 @@
             <a:fld id="{D959F413-3B1F-4EDA-9678-B877E1C4A860}" type="datetimeFigureOut">
               <a:rPr lang="en-US" smtClean="0"/>
               <a:pPr/>
-              <a:t>2/4/2013</a:t>
+              <a:t>3/2/2013</a:t>
             </a:fld>
             <a:endParaRPr lang="en-US"/>
           </a:p>
@@ -1748,7 +1748,7 @@
             <a:fld id="{D959F413-3B1F-4EDA-9678-B877E1C4A860}" type="datetimeFigureOut">
               <a:rPr lang="en-US" smtClean="0"/>
               <a:pPr/>
-              <a:t>2/4/2013</a:t>
+              <a:t>3/2/2013</a:t>
             </a:fld>
             <a:endParaRPr lang="en-US"/>
           </a:p>
@@ -1863,7 +1863,7 @@
             <a:fld id="{D959F413-3B1F-4EDA-9678-B877E1C4A860}" type="datetimeFigureOut">
               <a:rPr lang="en-US" smtClean="0"/>
               <a:pPr/>
-              <a:t>2/4/2013</a:t>
+              <a:t>3/2/2013</a:t>
             </a:fld>
             <a:endParaRPr lang="en-US"/>
           </a:p>
@@ -1955,7 +1955,7 @@
             <a:fld id="{D959F413-3B1F-4EDA-9678-B877E1C4A860}" type="datetimeFigureOut">
               <a:rPr lang="en-US" smtClean="0"/>
               <a:pPr/>
-              <a:t>2/4/2013</a:t>
+              <a:t>3/2/2013</a:t>
             </a:fld>
             <a:endParaRPr lang="en-US"/>
           </a:p>
@@ -2229,7 +2229,7 @@
             <a:fld id="{D959F413-3B1F-4EDA-9678-B877E1C4A860}" type="datetimeFigureOut">
               <a:rPr lang="en-US" smtClean="0"/>
               <a:pPr/>
-              <a:t>2/4/2013</a:t>
+              <a:t>3/2/2013</a:t>
             </a:fld>
             <a:endParaRPr lang="en-US"/>
           </a:p>
@@ -2483,7 +2483,7 @@
             <a:fld id="{D959F413-3B1F-4EDA-9678-B877E1C4A860}" type="datetimeFigureOut">
               <a:rPr lang="en-US" smtClean="0"/>
               <a:pPr/>
-              <a:t>2/4/2013</a:t>
+              <a:t>3/2/2013</a:t>
             </a:fld>
             <a:endParaRPr lang="en-US"/>
           </a:p>
@@ -2693,7 +2693,7 @@
             <a:fld id="{D959F413-3B1F-4EDA-9678-B877E1C4A860}" type="datetimeFigureOut">
               <a:rPr lang="en-US" smtClean="0"/>
               <a:pPr/>
-              <a:t>2/4/2013</a:t>
+              <a:t>3/2/2013</a:t>
             </a:fld>
             <a:endParaRPr lang="en-US"/>
           </a:p>
@@ -3283,7 +3283,7 @@
         <p:spPr>
           <a:xfrm>
             <a:off x="5181600" y="1371600"/>
-            <a:ext cx="1066800" cy="276999"/>
+            <a:ext cx="1066800" cy="461665"/>
           </a:xfrm>
           <a:prstGeom prst="rect">
             <a:avLst/>
@@ -3304,6 +3304,10 @@
           <a:lstStyle/>
           <a:p>
             <a:pPr algn="ctr"/>
+            <a:r>
+              <a:rPr lang="en-US" sz="1200" dirty="0" smtClean="0"/>
+              <a:t>Shooter Low Speed</a:t>
+            </a:r>
             <a:endParaRPr lang="en-US" sz="1200" dirty="0"/>
           </a:p>
         </p:txBody>
@@ -3317,9 +3321,9 @@
           <p:nvPr/>
         </p:nvCxnSpPr>
         <p:spPr>
-          <a:xfrm flipH="1">
-            <a:off x="4419600" y="1510100"/>
-            <a:ext cx="762000" cy="13901"/>
+          <a:xfrm rot="10800000">
+            <a:off x="4419600" y="1524001"/>
+            <a:ext cx="762000" cy="78432"/>
           </a:xfrm>
           <a:prstGeom prst="straightConnector1">
             <a:avLst/>
@@ -3375,7 +3379,7 @@
             <a:pPr algn="ctr"/>
             <a:r>
               <a:rPr lang="en-US" sz="1200" dirty="0" smtClean="0"/>
-              <a:t>Shooter Feed Test</a:t>
+              <a:t>Shooter High Speed</a:t>
             </a:r>
             <a:endParaRPr lang="en-US" sz="1200" dirty="0"/>
           </a:p>
@@ -3801,7 +3805,6 @@
               <a:rPr lang="en-US" sz="1200" dirty="0" smtClean="0"/>
               <a:t>Shooter Up</a:t>
             </a:r>
-            <a:endParaRPr lang="en-US" sz="1200" dirty="0" smtClean="0"/>
           </a:p>
         </p:txBody>
       </p:sp>
@@ -4130,8 +4133,8 @@
         </p:nvSpPr>
         <p:spPr>
           <a:xfrm>
-            <a:off x="2514600" y="609600"/>
-            <a:ext cx="1295400" cy="276999"/>
+            <a:off x="2667000" y="228600"/>
+            <a:ext cx="990600" cy="461665"/>
           </a:xfrm>
           <a:prstGeom prst="rect">
             <a:avLst/>
@@ -4152,6 +4155,10 @@
           <a:lstStyle/>
           <a:p>
             <a:pPr algn="ctr"/>
+            <a:r>
+              <a:rPr lang="en-US" sz="1200" dirty="0" smtClean="0"/>
+              <a:t>Shooter Feed Test</a:t>
+            </a:r>
             <a:endParaRPr lang="en-US" sz="1200" dirty="0"/>
           </a:p>
         </p:txBody>
@@ -4165,9 +4172,9 @@
           <p:nvPr/>
         </p:nvCxnSpPr>
         <p:spPr>
-          <a:xfrm flipH="1">
-            <a:off x="3048000" y="886599"/>
-            <a:ext cx="114300" cy="180201"/>
+          <a:xfrm rot="5400000">
+            <a:off x="2878783" y="859482"/>
+            <a:ext cx="452735" cy="114300"/>
           </a:xfrm>
           <a:prstGeom prst="straightConnector1">
             <a:avLst/>
@@ -4200,7 +4207,7 @@
         <p:spPr>
           <a:xfrm>
             <a:off x="1676400" y="304800"/>
-            <a:ext cx="762000" cy="276999"/>
+            <a:ext cx="762000" cy="461665"/>
           </a:xfrm>
           <a:prstGeom prst="rect">
             <a:avLst/>
@@ -4221,6 +4228,10 @@
           <a:lstStyle/>
           <a:p>
             <a:pPr algn="ctr"/>
+            <a:r>
+              <a:rPr lang="en-US" sz="1200" dirty="0" smtClean="0"/>
+              <a:t>Shooter Off</a:t>
+            </a:r>
             <a:endParaRPr lang="en-US" sz="1200" dirty="0"/>
           </a:p>
         </p:txBody>
@@ -4235,8 +4246,8 @@
         </p:nvCxnSpPr>
         <p:spPr>
           <a:xfrm rot="16200000" flipH="1">
-            <a:off x="1814900" y="824299"/>
-            <a:ext cx="561201" cy="76200"/>
+            <a:off x="1907233" y="916631"/>
+            <a:ext cx="376534" cy="76201"/>
           </a:xfrm>
           <a:prstGeom prst="straightConnector1">
             <a:avLst/>

</xml_diff>

<commit_message>
Changes to shooter code to account for new elevation modes
</commit_message>
<xml_diff>
--- a/ControllerLayout.pptx
+++ b/ControllerLayout.pptx
@@ -290,7 +290,7 @@
             <a:fld id="{D959F413-3B1F-4EDA-9678-B877E1C4A860}" type="datetimeFigureOut">
               <a:rPr lang="en-US" smtClean="0"/>
               <a:pPr/>
-              <a:t>3/2/2013</a:t>
+              <a:t>3/5/2013</a:t>
             </a:fld>
             <a:endParaRPr lang="en-US"/>
           </a:p>
@@ -457,7 +457,7 @@
             <a:fld id="{D959F413-3B1F-4EDA-9678-B877E1C4A860}" type="datetimeFigureOut">
               <a:rPr lang="en-US" smtClean="0"/>
               <a:pPr/>
-              <a:t>3/2/2013</a:t>
+              <a:t>3/5/2013</a:t>
             </a:fld>
             <a:endParaRPr lang="en-US"/>
           </a:p>
@@ -634,7 +634,7 @@
             <a:fld id="{D959F413-3B1F-4EDA-9678-B877E1C4A860}" type="datetimeFigureOut">
               <a:rPr lang="en-US" smtClean="0"/>
               <a:pPr/>
-              <a:t>3/2/2013</a:t>
+              <a:t>3/5/2013</a:t>
             </a:fld>
             <a:endParaRPr lang="en-US"/>
           </a:p>
@@ -801,7 +801,7 @@
             <a:fld id="{D959F413-3B1F-4EDA-9678-B877E1C4A860}" type="datetimeFigureOut">
               <a:rPr lang="en-US" smtClean="0"/>
               <a:pPr/>
-              <a:t>3/2/2013</a:t>
+              <a:t>3/5/2013</a:t>
             </a:fld>
             <a:endParaRPr lang="en-US"/>
           </a:p>
@@ -1044,7 +1044,7 @@
             <a:fld id="{D959F413-3B1F-4EDA-9678-B877E1C4A860}" type="datetimeFigureOut">
               <a:rPr lang="en-US" smtClean="0"/>
               <a:pPr/>
-              <a:t>3/2/2013</a:t>
+              <a:t>3/5/2013</a:t>
             </a:fld>
             <a:endParaRPr lang="en-US"/>
           </a:p>
@@ -1329,7 +1329,7 @@
             <a:fld id="{D959F413-3B1F-4EDA-9678-B877E1C4A860}" type="datetimeFigureOut">
               <a:rPr lang="en-US" smtClean="0"/>
               <a:pPr/>
-              <a:t>3/2/2013</a:t>
+              <a:t>3/5/2013</a:t>
             </a:fld>
             <a:endParaRPr lang="en-US"/>
           </a:p>
@@ -1748,7 +1748,7 @@
             <a:fld id="{D959F413-3B1F-4EDA-9678-B877E1C4A860}" type="datetimeFigureOut">
               <a:rPr lang="en-US" smtClean="0"/>
               <a:pPr/>
-              <a:t>3/2/2013</a:t>
+              <a:t>3/5/2013</a:t>
             </a:fld>
             <a:endParaRPr lang="en-US"/>
           </a:p>
@@ -1863,7 +1863,7 @@
             <a:fld id="{D959F413-3B1F-4EDA-9678-B877E1C4A860}" type="datetimeFigureOut">
               <a:rPr lang="en-US" smtClean="0"/>
               <a:pPr/>
-              <a:t>3/2/2013</a:t>
+              <a:t>3/5/2013</a:t>
             </a:fld>
             <a:endParaRPr lang="en-US"/>
           </a:p>
@@ -1955,7 +1955,7 @@
             <a:fld id="{D959F413-3B1F-4EDA-9678-B877E1C4A860}" type="datetimeFigureOut">
               <a:rPr lang="en-US" smtClean="0"/>
               <a:pPr/>
-              <a:t>3/2/2013</a:t>
+              <a:t>3/5/2013</a:t>
             </a:fld>
             <a:endParaRPr lang="en-US"/>
           </a:p>
@@ -2229,7 +2229,7 @@
             <a:fld id="{D959F413-3B1F-4EDA-9678-B877E1C4A860}" type="datetimeFigureOut">
               <a:rPr lang="en-US" smtClean="0"/>
               <a:pPr/>
-              <a:t>3/2/2013</a:t>
+              <a:t>3/5/2013</a:t>
             </a:fld>
             <a:endParaRPr lang="en-US"/>
           </a:p>
@@ -2483,7 +2483,7 @@
             <a:fld id="{D959F413-3B1F-4EDA-9678-B877E1C4A860}" type="datetimeFigureOut">
               <a:rPr lang="en-US" smtClean="0"/>
               <a:pPr/>
-              <a:t>3/2/2013</a:t>
+              <a:t>3/5/2013</a:t>
             </a:fld>
             <a:endParaRPr lang="en-US"/>
           </a:p>
@@ -2693,7 +2693,7 @@
             <a:fld id="{D959F413-3B1F-4EDA-9678-B877E1C4A860}" type="datetimeFigureOut">
               <a:rPr lang="en-US" smtClean="0"/>
               <a:pPr/>
-              <a:t>3/2/2013</a:t>
+              <a:t>3/5/2013</a:t>
             </a:fld>
             <a:endParaRPr lang="en-US"/>
           </a:p>
@@ -3283,7 +3283,7 @@
         <p:spPr>
           <a:xfrm>
             <a:off x="5181600" y="1371600"/>
-            <a:ext cx="1066800" cy="461665"/>
+            <a:ext cx="1600200" cy="461665"/>
           </a:xfrm>
           <a:prstGeom prst="rect">
             <a:avLst/>
@@ -3306,7 +3306,11 @@
             <a:pPr algn="ctr"/>
             <a:r>
               <a:rPr lang="en-US" sz="1200" dirty="0" smtClean="0"/>
-              <a:t>Shooter Low Speed</a:t>
+              <a:t>Shooter Low </a:t>
+            </a:r>
+            <a:r>
+              <a:rPr lang="en-US" sz="1200" dirty="0" smtClean="0"/>
+              <a:t>Speed (Pyramid Shot)</a:t>
             </a:r>
             <a:endParaRPr lang="en-US" sz="1200" dirty="0"/>
           </a:p>
@@ -3322,8 +3326,8 @@
         </p:nvCxnSpPr>
         <p:spPr>
           <a:xfrm rot="10800000">
-            <a:off x="4419600" y="1524001"/>
-            <a:ext cx="762000" cy="78432"/>
+            <a:off x="4419600" y="1524013"/>
+            <a:ext cx="762000" cy="78420"/>
           </a:xfrm>
           <a:prstGeom prst="straightConnector1">
             <a:avLst/>
@@ -3356,7 +3360,7 @@
         <p:spPr>
           <a:xfrm>
             <a:off x="5029200" y="609600"/>
-            <a:ext cx="1371600" cy="461665"/>
+            <a:ext cx="1524000" cy="461665"/>
           </a:xfrm>
           <a:prstGeom prst="rect">
             <a:avLst/>
@@ -3379,7 +3383,11 @@
             <a:pPr algn="ctr"/>
             <a:r>
               <a:rPr lang="en-US" sz="1200" dirty="0" smtClean="0"/>
-              <a:t>Shooter High Speed</a:t>
+              <a:t>Shooter High </a:t>
+            </a:r>
+            <a:r>
+              <a:rPr lang="en-US" sz="1200" dirty="0" smtClean="0"/>
+              <a:t>Speed (Long Shot)</a:t>
             </a:r>
             <a:endParaRPr lang="en-US" sz="1200" dirty="0"/>
           </a:p>
@@ -3839,10 +3847,9 @@
           <a:p>
             <a:pPr algn="ctr"/>
             <a:r>
-              <a:rPr lang="en-US" sz="1200" smtClean="0"/>
+              <a:rPr lang="en-US" sz="1200" dirty="0" smtClean="0"/>
               <a:t>Shooter Down</a:t>
             </a:r>
-            <a:endParaRPr lang="en-US" sz="1200" dirty="0" smtClean="0"/>
           </a:p>
         </p:txBody>
       </p:sp>

</xml_diff>